<commit_message>
[master] updated guide with git installation tips
</commit_message>
<xml_diff>
--- a/guides/setup_development_environment.pptx
+++ b/guides/setup_development_environment.pptx
@@ -5,7 +5,7 @@
     <p:sldMasterId id="2147483648" r:id="rId1"/>
   </p:sldMasterIdLst>
   <p:notesMasterIdLst>
-    <p:notesMasterId r:id="rId12"/>
+    <p:notesMasterId r:id="rId13"/>
   </p:notesMasterIdLst>
   <p:sldIdLst>
     <p:sldId id="259" r:id="rId2"/>
@@ -18,6 +18,7 @@
     <p:sldId id="321" r:id="rId9"/>
     <p:sldId id="262" r:id="rId10"/>
     <p:sldId id="322" r:id="rId11"/>
+    <p:sldId id="323" r:id="rId12"/>
   </p:sldIdLst>
   <p:sldSz cx="12192000" cy="6858000"/>
   <p:notesSz cx="6858000" cy="9144000"/>
@@ -120,6 +121,9 @@
     <p:ext uri="{EFAFB233-063F-42B5-8137-9DF3F51BA10A}">
       <p15:sldGuideLst xmlns:p15="http://schemas.microsoft.com/office/powerpoint/2012/main"/>
     </p:ext>
+    <p:ext uri="{2D200454-40CA-4A62-9FC3-DE9A4176ACB9}">
+      <p15:notesGuideLst xmlns:p15="http://schemas.microsoft.com/office/powerpoint/2012/main"/>
+    </p:ext>
   </p:extLst>
 </p:presentation>
 </file>
@@ -206,7 +210,7 @@
           <a:p>
             <a:fld id="{81C4B3FE-0320-8142-8396-5C3025C019EC}" type="datetimeFigureOut">
               <a:rPr lang="en-IT" smtClean="0"/>
-              <a:t>19/02/22</a:t>
+              <a:t>01/03/22</a:t>
             </a:fld>
             <a:endParaRPr lang="en-IT"/>
           </a:p>
@@ -2465,6 +2469,7 @@
     <p:sldLayoutId id="2147483649" r:id="rId3"/>
     <p:sldLayoutId id="2147483654" r:id="rId4"/>
   </p:sldLayoutIdLst>
+  <p:hf hdr="0" ftr="0" dt="0"/>
   <p:txStyles>
     <p:titleStyle>
       <a:lvl1pPr algn="ctr" defTabSz="914400" rtl="0" eaLnBrk="1" latinLnBrk="0" hangingPunct="1">
@@ -2836,6 +2841,35 @@
           </a:p>
         </p:txBody>
       </p:sp>
+      <p:sp>
+        <p:nvSpPr>
+          <p:cNvPr id="4" name="Slide Number Placeholder 3">
+            <a:extLst>
+              <a:ext uri="{FF2B5EF4-FFF2-40B4-BE49-F238E27FC236}">
+                <a16:creationId xmlns:a16="http://schemas.microsoft.com/office/drawing/2014/main" id="{92A312FC-1060-5642-9249-E2A5FCDA6EAE}"/>
+              </a:ext>
+            </a:extLst>
+          </p:cNvPr>
+          <p:cNvSpPr>
+            <a:spLocks noGrp="1"/>
+          </p:cNvSpPr>
+          <p:nvPr>
+            <p:ph type="sldNum" sz="quarter" idx="10"/>
+          </p:nvPr>
+        </p:nvSpPr>
+        <p:spPr/>
+        <p:txBody>
+          <a:bodyPr/>
+          <a:lstStyle/>
+          <a:p>
+            <a:fld id="{31DE2C5B-556E-47B8-A792-024C2FCA4ACC}" type="slidenum">
+              <a:rPr lang="en-GB" smtClean="0"/>
+              <a:t>1</a:t>
+            </a:fld>
+            <a:endParaRPr lang="en-GB"/>
+          </a:p>
+        </p:txBody>
+      </p:sp>
     </p:spTree>
     <p:extLst>
       <p:ext uri="{BB962C8B-B14F-4D97-AF65-F5344CB8AC3E}">
@@ -2888,10 +2922,17 @@
           <a:lstStyle/>
           <a:p>
             <a:r>
-              <a:rPr lang="en-IT"/>
-              <a:t>Install everything</a:t>
-            </a:r>
-            <a:endParaRPr lang="en-IT" dirty="0"/>
+              <a:rPr lang="en-IT" dirty="0"/>
+              <a:t>Install everything (P</a:t>
+            </a:r>
+            <a:r>
+              <a:rPr lang="en-GB" dirty="0"/>
+              <a:t>a</a:t>
+            </a:r>
+            <a:r>
+              <a:rPr lang="en-IT" dirty="0"/>
+              <a:t>rt 1)</a:t>
+            </a:r>
           </a:p>
         </p:txBody>
       </p:sp>
@@ -2919,7 +2960,7 @@
         </p:spPr>
         <p:txBody>
           <a:bodyPr>
-            <a:normAutofit lnSpcReduction="10000"/>
+            <a:normAutofit/>
           </a:bodyPr>
           <a:lstStyle/>
           <a:p>
@@ -3048,94 +3089,34 @@
               <a:t>Follow the instructions…</a:t>
             </a:r>
           </a:p>
-          <a:p>
-            <a:pPr lvl="1"/>
-            <a:r>
-              <a:rPr lang="en-GB" b="1" dirty="0">
-                <a:ea typeface="Palatino" pitchFamily="2" charset="77"/>
-              </a:rPr>
-              <a:t>Step 4</a:t>
-            </a:r>
-            <a:r>
-              <a:rPr lang="en-GB" dirty="0">
-                <a:ea typeface="Palatino" pitchFamily="2" charset="77"/>
-              </a:rPr>
-              <a:t>: Install GIT </a:t>
-            </a:r>
-          </a:p>
-          <a:p>
-            <a:pPr lvl="2"/>
-            <a:r>
-              <a:rPr lang="en-IT" dirty="0">
-                <a:ea typeface="Palatino" pitchFamily="2" charset="77"/>
-              </a:rPr>
-              <a:t>Go to &gt; </a:t>
-            </a:r>
-            <a:r>
-              <a:rPr lang="en-GB" dirty="0">
-                <a:ea typeface="Palatino" pitchFamily="2" charset="77"/>
-                <a:hlinkClick r:id="rId4"/>
-              </a:rPr>
-              <a:t>https://git-scm.com/book/en/v2/Getting-Started-Installing-Git</a:t>
-            </a:r>
-            <a:endParaRPr lang="en-GB" dirty="0">
-              <a:ea typeface="Palatino" pitchFamily="2" charset="77"/>
-            </a:endParaRPr>
-          </a:p>
-          <a:p>
-            <a:pPr lvl="2"/>
-            <a:r>
-              <a:rPr lang="en-GB" dirty="0">
-                <a:ea typeface="Palatino" pitchFamily="2" charset="77"/>
-              </a:rPr>
-              <a:t>Follow the instructions…</a:t>
-            </a:r>
-          </a:p>
-          <a:p>
-            <a:pPr lvl="1"/>
-            <a:r>
-              <a:rPr lang="en-GB" b="1" dirty="0">
-                <a:ea typeface="Palatino" pitchFamily="2" charset="77"/>
-              </a:rPr>
-              <a:t>Step 5</a:t>
-            </a:r>
-            <a:r>
-              <a:rPr lang="en-GB" dirty="0">
-                <a:ea typeface="Palatino" pitchFamily="2" charset="77"/>
-              </a:rPr>
-              <a:t>: Test that everything is working</a:t>
-            </a:r>
-          </a:p>
-          <a:p>
-            <a:pPr lvl="2"/>
-            <a:r>
-              <a:rPr lang="en-GB" dirty="0">
-                <a:ea typeface="Palatino" pitchFamily="2" charset="77"/>
-              </a:rPr>
-              <a:t>Go to &gt; </a:t>
-            </a:r>
-            <a:r>
-              <a:rPr lang="en-GB" dirty="0">
-                <a:ea typeface="Palatino" pitchFamily="2" charset="77"/>
-                <a:hlinkClick r:id="rId5"/>
-              </a:rPr>
-              <a:t>https://docs.flutter.dev/get-started/test-drive?tab=vscode</a:t>
-            </a:r>
-            <a:r>
-              <a:rPr lang="en-GB" dirty="0">
-                <a:ea typeface="Palatino" pitchFamily="2" charset="77"/>
-              </a:rPr>
-              <a:t> </a:t>
-            </a:r>
-          </a:p>
-          <a:p>
-            <a:pPr lvl="2"/>
-            <a:r>
-              <a:rPr lang="en-GB" dirty="0">
-                <a:ea typeface="Palatino" pitchFamily="2" charset="77"/>
-              </a:rPr>
-              <a:t>Follow the instructions…</a:t>
-            </a:r>
+        </p:txBody>
+      </p:sp>
+      <p:sp>
+        <p:nvSpPr>
+          <p:cNvPr id="4" name="Slide Number Placeholder 3">
+            <a:extLst>
+              <a:ext uri="{FF2B5EF4-FFF2-40B4-BE49-F238E27FC236}">
+                <a16:creationId xmlns:a16="http://schemas.microsoft.com/office/drawing/2014/main" id="{ED05C487-70B4-174B-A325-CCA9C11792FF}"/>
+              </a:ext>
+            </a:extLst>
+          </p:cNvPr>
+          <p:cNvSpPr>
+            <a:spLocks noGrp="1"/>
+          </p:cNvSpPr>
+          <p:nvPr>
+            <p:ph type="sldNum" sz="quarter" idx="12"/>
+          </p:nvPr>
+        </p:nvSpPr>
+        <p:spPr/>
+        <p:txBody>
+          <a:bodyPr/>
+          <a:lstStyle/>
+          <a:p>
+            <a:fld id="{31DE2C5B-556E-47B8-A792-024C2FCA4ACC}" type="slidenum">
+              <a:rPr lang="en-GB" smtClean="0"/>
+              <a:t>10</a:t>
+            </a:fld>
+            <a:endParaRPr lang="en-GB"/>
           </a:p>
         </p:txBody>
       </p:sp>
@@ -3143,6 +3124,364 @@
     <p:extLst>
       <p:ext uri="{BB962C8B-B14F-4D97-AF65-F5344CB8AC3E}">
         <p14:creationId xmlns:p14="http://schemas.microsoft.com/office/powerpoint/2010/main" val="3147511355"/>
+      </p:ext>
+    </p:extLst>
+  </p:cSld>
+  <p:clrMapOvr>
+    <a:masterClrMapping/>
+  </p:clrMapOvr>
+</p:sld>
+</file>
+
+<file path=ppt/slides/slide11.xml><?xml version="1.0" encoding="utf-8"?>
+<p:sld xmlns:a="http://schemas.openxmlformats.org/drawingml/2006/main" xmlns:r="http://schemas.openxmlformats.org/officeDocument/2006/relationships" xmlns:p="http://schemas.openxmlformats.org/presentationml/2006/main">
+  <p:cSld>
+    <p:spTree>
+      <p:nvGrpSpPr>
+        <p:cNvPr id="1" name=""/>
+        <p:cNvGrpSpPr/>
+        <p:nvPr/>
+      </p:nvGrpSpPr>
+      <p:grpSpPr>
+        <a:xfrm>
+          <a:off x="0" y="0"/>
+          <a:ext cx="0" cy="0"/>
+          <a:chOff x="0" y="0"/>
+          <a:chExt cx="0" cy="0"/>
+        </a:xfrm>
+      </p:grpSpPr>
+      <p:sp>
+        <p:nvSpPr>
+          <p:cNvPr id="2" name="Title 1">
+            <a:extLst>
+              <a:ext uri="{FF2B5EF4-FFF2-40B4-BE49-F238E27FC236}">
+                <a16:creationId xmlns:a16="http://schemas.microsoft.com/office/drawing/2014/main" id="{DCEB9E4F-F82C-A64F-809D-B943BB0A7B79}"/>
+              </a:ext>
+            </a:extLst>
+          </p:cNvPr>
+          <p:cNvSpPr>
+            <a:spLocks noGrp="1"/>
+          </p:cNvSpPr>
+          <p:nvPr>
+            <p:ph type="title"/>
+          </p:nvPr>
+        </p:nvSpPr>
+        <p:spPr/>
+        <p:txBody>
+          <a:bodyPr/>
+          <a:lstStyle/>
+          <a:p>
+            <a:r>
+              <a:rPr lang="en-IT" dirty="0"/>
+              <a:t>Install everything (Part 2)</a:t>
+            </a:r>
+          </a:p>
+        </p:txBody>
+      </p:sp>
+      <p:sp>
+        <p:nvSpPr>
+          <p:cNvPr id="3" name="Content Placeholder 2">
+            <a:extLst>
+              <a:ext uri="{FF2B5EF4-FFF2-40B4-BE49-F238E27FC236}">
+                <a16:creationId xmlns:a16="http://schemas.microsoft.com/office/drawing/2014/main" id="{07EEA99A-73A7-F949-9D8F-EEED9045B6FA}"/>
+              </a:ext>
+            </a:extLst>
+          </p:cNvPr>
+          <p:cNvSpPr>
+            <a:spLocks noGrp="1"/>
+          </p:cNvSpPr>
+          <p:nvPr>
+            <p:ph sz="half" idx="1"/>
+          </p:nvPr>
+        </p:nvSpPr>
+        <p:spPr>
+          <a:xfrm>
+            <a:off x="428171" y="1364342"/>
+            <a:ext cx="11368313" cy="5331731"/>
+          </a:xfrm>
+        </p:spPr>
+        <p:txBody>
+          <a:bodyPr>
+            <a:normAutofit/>
+          </a:bodyPr>
+          <a:lstStyle/>
+          <a:p>
+            <a:r>
+              <a:rPr lang="en-GB" dirty="0">
+                <a:ea typeface="Palatino" pitchFamily="2" charset="77"/>
+              </a:rPr>
+              <a:t>Do the following steps, in this order:</a:t>
+            </a:r>
+          </a:p>
+          <a:p>
+            <a:endParaRPr lang="en-GB" dirty="0">
+              <a:ea typeface="Palatino" pitchFamily="2" charset="77"/>
+            </a:endParaRPr>
+          </a:p>
+          <a:p>
+            <a:pPr lvl="1"/>
+            <a:r>
+              <a:rPr lang="en-GB" b="1" dirty="0">
+                <a:ea typeface="Palatino" pitchFamily="2" charset="77"/>
+              </a:rPr>
+              <a:t>Step 4</a:t>
+            </a:r>
+            <a:r>
+              <a:rPr lang="en-GB" dirty="0">
+                <a:ea typeface="Palatino" pitchFamily="2" charset="77"/>
+              </a:rPr>
+              <a:t>: Install GIT </a:t>
+            </a:r>
+          </a:p>
+          <a:p>
+            <a:pPr lvl="2"/>
+            <a:r>
+              <a:rPr lang="en-IT" dirty="0">
+                <a:ea typeface="Palatino" pitchFamily="2" charset="77"/>
+              </a:rPr>
+              <a:t>Go to &gt; </a:t>
+            </a:r>
+            <a:r>
+              <a:rPr lang="en-GB" dirty="0">
+                <a:ea typeface="Palatino" pitchFamily="2" charset="77"/>
+                <a:hlinkClick r:id="rId2"/>
+              </a:rPr>
+              <a:t>https://git-scm.com/book/en/v2/Getting-Started-Installing-Git</a:t>
+            </a:r>
+            <a:endParaRPr lang="en-GB" dirty="0">
+              <a:ea typeface="Palatino" pitchFamily="2" charset="77"/>
+            </a:endParaRPr>
+          </a:p>
+          <a:p>
+            <a:pPr lvl="2"/>
+            <a:r>
+              <a:rPr lang="en-GB" dirty="0">
+                <a:ea typeface="Palatino" pitchFamily="2" charset="77"/>
+              </a:rPr>
+              <a:t>Follow the instructions…</a:t>
+            </a:r>
+          </a:p>
+          <a:p>
+            <a:pPr lvl="2"/>
+            <a:r>
+              <a:rPr lang="en-GB" dirty="0">
+                <a:ea typeface="Palatino" pitchFamily="2" charset="77"/>
+              </a:rPr>
+              <a:t>After the installation, open the terminal and run the two following commands:</a:t>
+            </a:r>
+            <a:br>
+              <a:rPr lang="en-GB" dirty="0">
+                <a:ea typeface="Palatino" pitchFamily="2" charset="77"/>
+              </a:rPr>
+            </a:br>
+            <a:r>
+              <a:rPr lang="en-GB" dirty="0">
+                <a:latin typeface="Courier" pitchFamily="2" charset="0"/>
+                <a:ea typeface="Palatino" pitchFamily="2" charset="77"/>
+              </a:rPr>
+              <a:t>git config --global </a:t>
+            </a:r>
+            <a:r>
+              <a:rPr lang="en-GB" dirty="0" err="1">
+                <a:latin typeface="Courier" pitchFamily="2" charset="0"/>
+                <a:ea typeface="Palatino" pitchFamily="2" charset="77"/>
+              </a:rPr>
+              <a:t>user.name</a:t>
+            </a:r>
+            <a:r>
+              <a:rPr lang="en-GB" dirty="0">
+                <a:latin typeface="Courier" pitchFamily="2" charset="0"/>
+                <a:ea typeface="Palatino" pitchFamily="2" charset="77"/>
+              </a:rPr>
+              <a:t> ”FirstName </a:t>
+            </a:r>
+            <a:r>
+              <a:rPr lang="en-GB" dirty="0" err="1">
+                <a:latin typeface="Courier" pitchFamily="2" charset="0"/>
+                <a:ea typeface="Palatino" pitchFamily="2" charset="77"/>
+              </a:rPr>
+              <a:t>LastName</a:t>
+            </a:r>
+            <a:r>
+              <a:rPr lang="en-GB" dirty="0">
+                <a:latin typeface="Courier" pitchFamily="2" charset="0"/>
+                <a:ea typeface="Palatino" pitchFamily="2" charset="77"/>
+              </a:rPr>
+              <a:t>” </a:t>
+            </a:r>
+            <a:r>
+              <a:rPr lang="en-GB" dirty="0">
+                <a:ea typeface="Palatino" pitchFamily="2" charset="77"/>
+              </a:rPr>
+              <a:t>(where FirstName and </a:t>
+            </a:r>
+            <a:r>
+              <a:rPr lang="en-GB" dirty="0" err="1">
+                <a:ea typeface="Palatino" pitchFamily="2" charset="77"/>
+              </a:rPr>
+              <a:t>LastName</a:t>
+            </a:r>
+            <a:r>
+              <a:rPr lang="en-GB" dirty="0">
+                <a:ea typeface="Palatino" pitchFamily="2" charset="77"/>
+              </a:rPr>
+              <a:t> are your actual first name and last name, e.g., Giacomo Cappon)</a:t>
+            </a:r>
+            <a:br>
+              <a:rPr lang="en-GB" dirty="0">
+                <a:ea typeface="Palatino" pitchFamily="2" charset="77"/>
+              </a:rPr>
+            </a:br>
+            <a:r>
+              <a:rPr lang="en-GB" dirty="0">
+                <a:latin typeface="Courier" pitchFamily="2" charset="0"/>
+                <a:ea typeface="Palatino" pitchFamily="2" charset="77"/>
+              </a:rPr>
+              <a:t>git config --global </a:t>
+            </a:r>
+            <a:r>
+              <a:rPr lang="en-GB" dirty="0" err="1">
+                <a:latin typeface="Courier" pitchFamily="2" charset="0"/>
+                <a:ea typeface="Palatino" pitchFamily="2" charset="77"/>
+              </a:rPr>
+              <a:t>user.email</a:t>
+            </a:r>
+            <a:r>
+              <a:rPr lang="en-GB" dirty="0">
+                <a:latin typeface="Courier" pitchFamily="2" charset="0"/>
+                <a:ea typeface="Palatino" pitchFamily="2" charset="77"/>
+              </a:rPr>
+              <a:t> ”</a:t>
+            </a:r>
+            <a:r>
+              <a:rPr lang="en-GB" dirty="0" err="1">
+                <a:latin typeface="Courier" pitchFamily="2" charset="0"/>
+                <a:ea typeface="Palatino" pitchFamily="2" charset="77"/>
+              </a:rPr>
+              <a:t>email@domain.com</a:t>
+            </a:r>
+            <a:r>
+              <a:rPr lang="en-GB" dirty="0">
+                <a:latin typeface="Courier" pitchFamily="2" charset="0"/>
+                <a:ea typeface="Palatino" pitchFamily="2" charset="77"/>
+              </a:rPr>
+              <a:t>” </a:t>
+            </a:r>
+            <a:r>
+              <a:rPr lang="en-GB" dirty="0">
+                <a:ea typeface="Palatino" pitchFamily="2" charset="77"/>
+              </a:rPr>
+              <a:t>(where </a:t>
+            </a:r>
+            <a:r>
+              <a:rPr lang="en-GB" dirty="0">
+                <a:latin typeface="Courier" pitchFamily="2" charset="0"/>
+                <a:ea typeface="Palatino" pitchFamily="2" charset="77"/>
+                <a:hlinkClick r:id="rId3"/>
+              </a:rPr>
+              <a:t>email@domain.com</a:t>
+            </a:r>
+            <a:r>
+              <a:rPr lang="en-GB" dirty="0">
+                <a:latin typeface="Courier" pitchFamily="2" charset="0"/>
+                <a:ea typeface="Palatino" pitchFamily="2" charset="77"/>
+              </a:rPr>
+              <a:t> </a:t>
+            </a:r>
+            <a:r>
+              <a:rPr lang="en-GB" dirty="0">
+                <a:ea typeface="Palatino" pitchFamily="2" charset="77"/>
+              </a:rPr>
+              <a:t>is the email you want to use as identifier. For simplicity, use the same email you will use to create the GitHub account)</a:t>
+            </a:r>
+          </a:p>
+          <a:p>
+            <a:pPr lvl="2"/>
+            <a:endParaRPr lang="en-GB" dirty="0">
+              <a:ea typeface="Palatino" pitchFamily="2" charset="77"/>
+            </a:endParaRPr>
+          </a:p>
+          <a:p>
+            <a:pPr lvl="1"/>
+            <a:r>
+              <a:rPr lang="en-GB" b="1" dirty="0">
+                <a:ea typeface="Palatino" pitchFamily="2" charset="77"/>
+              </a:rPr>
+              <a:t>Step 5</a:t>
+            </a:r>
+            <a:r>
+              <a:rPr lang="en-GB" dirty="0">
+                <a:ea typeface="Palatino" pitchFamily="2" charset="77"/>
+              </a:rPr>
+              <a:t>: Test that everything is working</a:t>
+            </a:r>
+          </a:p>
+          <a:p>
+            <a:pPr lvl="2"/>
+            <a:r>
+              <a:rPr lang="en-GB" dirty="0">
+                <a:ea typeface="Palatino" pitchFamily="2" charset="77"/>
+              </a:rPr>
+              <a:t>Go to &gt; </a:t>
+            </a:r>
+            <a:r>
+              <a:rPr lang="en-GB" dirty="0">
+                <a:ea typeface="Palatino" pitchFamily="2" charset="77"/>
+                <a:hlinkClick r:id="rId4"/>
+              </a:rPr>
+              <a:t>https://docs.flutter.dev/get-started/test-drive?tab=vscode</a:t>
+            </a:r>
+            <a:r>
+              <a:rPr lang="en-GB" dirty="0">
+                <a:ea typeface="Palatino" pitchFamily="2" charset="77"/>
+              </a:rPr>
+              <a:t> </a:t>
+            </a:r>
+          </a:p>
+          <a:p>
+            <a:pPr lvl="2"/>
+            <a:r>
+              <a:rPr lang="en-GB" dirty="0">
+                <a:ea typeface="Palatino" pitchFamily="2" charset="77"/>
+              </a:rPr>
+              <a:t>Follow the instructions…</a:t>
+            </a:r>
+          </a:p>
+        </p:txBody>
+      </p:sp>
+      <p:sp>
+        <p:nvSpPr>
+          <p:cNvPr id="4" name="Slide Number Placeholder 3">
+            <a:extLst>
+              <a:ext uri="{FF2B5EF4-FFF2-40B4-BE49-F238E27FC236}">
+                <a16:creationId xmlns:a16="http://schemas.microsoft.com/office/drawing/2014/main" id="{ED05C487-70B4-174B-A325-CCA9C11792FF}"/>
+              </a:ext>
+            </a:extLst>
+          </p:cNvPr>
+          <p:cNvSpPr>
+            <a:spLocks noGrp="1"/>
+          </p:cNvSpPr>
+          <p:nvPr>
+            <p:ph type="sldNum" sz="quarter" idx="12"/>
+          </p:nvPr>
+        </p:nvSpPr>
+        <p:spPr/>
+        <p:txBody>
+          <a:bodyPr/>
+          <a:lstStyle/>
+          <a:p>
+            <a:fld id="{31DE2C5B-556E-47B8-A792-024C2FCA4ACC}" type="slidenum">
+              <a:rPr lang="en-GB" smtClean="0"/>
+              <a:t>11</a:t>
+            </a:fld>
+            <a:endParaRPr lang="en-GB"/>
+          </a:p>
+        </p:txBody>
+      </p:sp>
+    </p:spTree>
+    <p:extLst>
+      <p:ext uri="{BB962C8B-B14F-4D97-AF65-F5344CB8AC3E}">
+        <p14:creationId xmlns:p14="http://schemas.microsoft.com/office/powerpoint/2010/main" val="2935002764"/>
       </p:ext>
     </p:extLst>
   </p:cSld>
@@ -3331,6 +3670,35 @@
               </a:rPr>
               <a:t>This document will give an overview of the development environment we are going to use during this course and will tell what to do to prepare it.</a:t>
             </a:r>
+          </a:p>
+        </p:txBody>
+      </p:sp>
+      <p:sp>
+        <p:nvSpPr>
+          <p:cNvPr id="4" name="Slide Number Placeholder 3">
+            <a:extLst>
+              <a:ext uri="{FF2B5EF4-FFF2-40B4-BE49-F238E27FC236}">
+                <a16:creationId xmlns:a16="http://schemas.microsoft.com/office/drawing/2014/main" id="{0B5E6889-29AD-4846-866A-18905E298D38}"/>
+              </a:ext>
+            </a:extLst>
+          </p:cNvPr>
+          <p:cNvSpPr>
+            <a:spLocks noGrp="1"/>
+          </p:cNvSpPr>
+          <p:nvPr>
+            <p:ph type="sldNum" sz="quarter" idx="12"/>
+          </p:nvPr>
+        </p:nvSpPr>
+        <p:spPr/>
+        <p:txBody>
+          <a:bodyPr/>
+          <a:lstStyle/>
+          <a:p>
+            <a:fld id="{31DE2C5B-556E-47B8-A792-024C2FCA4ACC}" type="slidenum">
+              <a:rPr lang="en-GB" smtClean="0"/>
+              <a:t>2</a:t>
+            </a:fld>
+            <a:endParaRPr lang="en-GB"/>
           </a:p>
         </p:txBody>
       </p:sp>
@@ -4550,6 +4918,35 @@
           </a:p>
         </p:txBody>
       </p:sp>
+      <p:sp>
+        <p:nvSpPr>
+          <p:cNvPr id="4" name="Slide Number Placeholder 3">
+            <a:extLst>
+              <a:ext uri="{FF2B5EF4-FFF2-40B4-BE49-F238E27FC236}">
+                <a16:creationId xmlns:a16="http://schemas.microsoft.com/office/drawing/2014/main" id="{251FAB8D-0B5A-1D45-8F26-93EEFDABA4E9}"/>
+              </a:ext>
+            </a:extLst>
+          </p:cNvPr>
+          <p:cNvSpPr>
+            <a:spLocks noGrp="1"/>
+          </p:cNvSpPr>
+          <p:nvPr>
+            <p:ph type="sldNum" sz="quarter" idx="12"/>
+          </p:nvPr>
+        </p:nvSpPr>
+        <p:spPr/>
+        <p:txBody>
+          <a:bodyPr/>
+          <a:lstStyle/>
+          <a:p>
+            <a:fld id="{31DE2C5B-556E-47B8-A792-024C2FCA4ACC}" type="slidenum">
+              <a:rPr lang="en-GB" smtClean="0"/>
+              <a:t>3</a:t>
+            </a:fld>
+            <a:endParaRPr lang="en-GB"/>
+          </a:p>
+        </p:txBody>
+      </p:sp>
     </p:spTree>
     <p:extLst>
       <p:ext uri="{BB962C8B-B14F-4D97-AF65-F5344CB8AC3E}">
@@ -4701,6 +5098,35 @@
           </a:prstGeom>
         </p:spPr>
       </p:pic>
+      <p:sp>
+        <p:nvSpPr>
+          <p:cNvPr id="4" name="Slide Number Placeholder 3">
+            <a:extLst>
+              <a:ext uri="{FF2B5EF4-FFF2-40B4-BE49-F238E27FC236}">
+                <a16:creationId xmlns:a16="http://schemas.microsoft.com/office/drawing/2014/main" id="{F4AA26A7-3348-BA4E-A78A-E1E6F275E9B5}"/>
+              </a:ext>
+            </a:extLst>
+          </p:cNvPr>
+          <p:cNvSpPr>
+            <a:spLocks noGrp="1"/>
+          </p:cNvSpPr>
+          <p:nvPr>
+            <p:ph type="sldNum" sz="quarter" idx="12"/>
+          </p:nvPr>
+        </p:nvSpPr>
+        <p:spPr/>
+        <p:txBody>
+          <a:bodyPr/>
+          <a:lstStyle/>
+          <a:p>
+            <a:fld id="{31DE2C5B-556E-47B8-A792-024C2FCA4ACC}" type="slidenum">
+              <a:rPr lang="en-GB" smtClean="0"/>
+              <a:t>4</a:t>
+            </a:fld>
+            <a:endParaRPr lang="en-GB"/>
+          </a:p>
+        </p:txBody>
+      </p:sp>
     </p:spTree>
     <p:extLst>
       <p:ext uri="{BB962C8B-B14F-4D97-AF65-F5344CB8AC3E}">
@@ -4943,6 +5369,35 @@
           </a:prstGeom>
         </p:spPr>
       </p:pic>
+      <p:sp>
+        <p:nvSpPr>
+          <p:cNvPr id="4" name="Slide Number Placeholder 3">
+            <a:extLst>
+              <a:ext uri="{FF2B5EF4-FFF2-40B4-BE49-F238E27FC236}">
+                <a16:creationId xmlns:a16="http://schemas.microsoft.com/office/drawing/2014/main" id="{6B0CFD40-6C26-A54D-8034-6B693F0839EB}"/>
+              </a:ext>
+            </a:extLst>
+          </p:cNvPr>
+          <p:cNvSpPr>
+            <a:spLocks noGrp="1"/>
+          </p:cNvSpPr>
+          <p:nvPr>
+            <p:ph type="sldNum" sz="quarter" idx="12"/>
+          </p:nvPr>
+        </p:nvSpPr>
+        <p:spPr/>
+        <p:txBody>
+          <a:bodyPr/>
+          <a:lstStyle/>
+          <a:p>
+            <a:fld id="{31DE2C5B-556E-47B8-A792-024C2FCA4ACC}" type="slidenum">
+              <a:rPr lang="en-GB" smtClean="0"/>
+              <a:t>5</a:t>
+            </a:fld>
+            <a:endParaRPr lang="en-GB"/>
+          </a:p>
+        </p:txBody>
+      </p:sp>
     </p:spTree>
     <p:extLst>
       <p:ext uri="{BB962C8B-B14F-4D97-AF65-F5344CB8AC3E}">
@@ -5178,6 +5633,35 @@
           </a:prstGeom>
         </p:spPr>
       </p:pic>
+      <p:sp>
+        <p:nvSpPr>
+          <p:cNvPr id="6" name="Slide Number Placeholder 5">
+            <a:extLst>
+              <a:ext uri="{FF2B5EF4-FFF2-40B4-BE49-F238E27FC236}">
+                <a16:creationId xmlns:a16="http://schemas.microsoft.com/office/drawing/2014/main" id="{65EA4F5B-0387-8C4D-8A9F-6993B9201F79}"/>
+              </a:ext>
+            </a:extLst>
+          </p:cNvPr>
+          <p:cNvSpPr>
+            <a:spLocks noGrp="1"/>
+          </p:cNvSpPr>
+          <p:nvPr>
+            <p:ph type="sldNum" sz="quarter" idx="12"/>
+          </p:nvPr>
+        </p:nvSpPr>
+        <p:spPr/>
+        <p:txBody>
+          <a:bodyPr/>
+          <a:lstStyle/>
+          <a:p>
+            <a:fld id="{31DE2C5B-556E-47B8-A792-024C2FCA4ACC}" type="slidenum">
+              <a:rPr lang="en-GB" smtClean="0"/>
+              <a:t>6</a:t>
+            </a:fld>
+            <a:endParaRPr lang="en-GB"/>
+          </a:p>
+        </p:txBody>
+      </p:sp>
     </p:spTree>
     <p:extLst>
       <p:ext uri="{BB962C8B-B14F-4D97-AF65-F5344CB8AC3E}">
@@ -5756,6 +6240,35 @@
           </a:fontRef>
         </p:style>
       </p:cxnSp>
+      <p:sp>
+        <p:nvSpPr>
+          <p:cNvPr id="3" name="Slide Number Placeholder 2">
+            <a:extLst>
+              <a:ext uri="{FF2B5EF4-FFF2-40B4-BE49-F238E27FC236}">
+                <a16:creationId xmlns:a16="http://schemas.microsoft.com/office/drawing/2014/main" id="{DBB44AC5-3D10-FE4E-B91F-F07DBE9B58DD}"/>
+              </a:ext>
+            </a:extLst>
+          </p:cNvPr>
+          <p:cNvSpPr>
+            <a:spLocks noGrp="1"/>
+          </p:cNvSpPr>
+          <p:nvPr>
+            <p:ph type="sldNum" sz="quarter" idx="12"/>
+          </p:nvPr>
+        </p:nvSpPr>
+        <p:spPr/>
+        <p:txBody>
+          <a:bodyPr/>
+          <a:lstStyle/>
+          <a:p>
+            <a:fld id="{31DE2C5B-556E-47B8-A792-024C2FCA4ACC}" type="slidenum">
+              <a:rPr lang="en-GB" smtClean="0"/>
+              <a:t>7</a:t>
+            </a:fld>
+            <a:endParaRPr lang="en-GB"/>
+          </a:p>
+        </p:txBody>
+      </p:sp>
     </p:spTree>
     <p:extLst>
       <p:ext uri="{BB962C8B-B14F-4D97-AF65-F5344CB8AC3E}">
@@ -5915,6 +6428,35 @@
           </a:prstGeom>
         </p:spPr>
       </p:pic>
+      <p:sp>
+        <p:nvSpPr>
+          <p:cNvPr id="4" name="Slide Number Placeholder 3">
+            <a:extLst>
+              <a:ext uri="{FF2B5EF4-FFF2-40B4-BE49-F238E27FC236}">
+                <a16:creationId xmlns:a16="http://schemas.microsoft.com/office/drawing/2014/main" id="{01545332-2D31-9D4F-B4BB-B8BF57928CC2}"/>
+              </a:ext>
+            </a:extLst>
+          </p:cNvPr>
+          <p:cNvSpPr>
+            <a:spLocks noGrp="1"/>
+          </p:cNvSpPr>
+          <p:nvPr>
+            <p:ph type="sldNum" sz="quarter" idx="12"/>
+          </p:nvPr>
+        </p:nvSpPr>
+        <p:spPr/>
+        <p:txBody>
+          <a:bodyPr/>
+          <a:lstStyle/>
+          <a:p>
+            <a:fld id="{31DE2C5B-556E-47B8-A792-024C2FCA4ACC}" type="slidenum">
+              <a:rPr lang="en-GB" smtClean="0"/>
+              <a:t>8</a:t>
+            </a:fld>
+            <a:endParaRPr lang="en-GB"/>
+          </a:p>
+        </p:txBody>
+      </p:sp>
     </p:spTree>
     <p:extLst>
       <p:ext uri="{BB962C8B-B14F-4D97-AF65-F5344CB8AC3E}">
@@ -6060,7 +6602,7 @@
               <a:rPr lang="en-IT" dirty="0">
                 <a:ea typeface="Palatino" pitchFamily="2" charset="77"/>
               </a:rPr>
-              <a:t>If an error appears you will need to install it (step 4 of slide 10).</a:t>
+              <a:t>If an error appears you will need to install it (step 4 of slide 11). Otherwise, if you see the git version printed out, you can skip step 4 of slide 11.</a:t>
             </a:r>
           </a:p>
         </p:txBody>
@@ -6101,6 +6643,35 @@
           </a:prstGeom>
         </p:spPr>
       </p:pic>
+      <p:sp>
+        <p:nvSpPr>
+          <p:cNvPr id="4" name="Slide Number Placeholder 3">
+            <a:extLst>
+              <a:ext uri="{FF2B5EF4-FFF2-40B4-BE49-F238E27FC236}">
+                <a16:creationId xmlns:a16="http://schemas.microsoft.com/office/drawing/2014/main" id="{FE01D888-710A-A44E-9C8F-17860AB7053F}"/>
+              </a:ext>
+            </a:extLst>
+          </p:cNvPr>
+          <p:cNvSpPr>
+            <a:spLocks noGrp="1"/>
+          </p:cNvSpPr>
+          <p:nvPr>
+            <p:ph type="sldNum" sz="quarter" idx="12"/>
+          </p:nvPr>
+        </p:nvSpPr>
+        <p:spPr/>
+        <p:txBody>
+          <a:bodyPr/>
+          <a:lstStyle/>
+          <a:p>
+            <a:fld id="{31DE2C5B-556E-47B8-A792-024C2FCA4ACC}" type="slidenum">
+              <a:rPr lang="en-GB" smtClean="0"/>
+              <a:t>9</a:t>
+            </a:fld>
+            <a:endParaRPr lang="en-GB" dirty="0"/>
+          </a:p>
+        </p:txBody>
+      </p:sp>
     </p:spTree>
     <p:extLst>
       <p:ext uri="{BB962C8B-B14F-4D97-AF65-F5344CB8AC3E}">

</xml_diff>

<commit_message>
[master] added a terminal primer to lesson 1 material and update the env setup guide
</commit_message>
<xml_diff>
--- a/guides/setup_development_environment.pptx
+++ b/guides/setup_development_environment.pptx
@@ -5,7 +5,7 @@
     <p:sldMasterId id="2147483648" r:id="rId1"/>
   </p:sldMasterIdLst>
   <p:notesMasterIdLst>
-    <p:notesMasterId r:id="rId13"/>
+    <p:notesMasterId r:id="rId14"/>
   </p:notesMasterIdLst>
   <p:sldIdLst>
     <p:sldId id="259" r:id="rId2"/>
@@ -16,9 +16,10 @@
     <p:sldId id="319" r:id="rId7"/>
     <p:sldId id="316" r:id="rId8"/>
     <p:sldId id="321" r:id="rId9"/>
-    <p:sldId id="262" r:id="rId10"/>
-    <p:sldId id="322" r:id="rId11"/>
-    <p:sldId id="323" r:id="rId12"/>
+    <p:sldId id="324" r:id="rId10"/>
+    <p:sldId id="262" r:id="rId11"/>
+    <p:sldId id="322" r:id="rId12"/>
+    <p:sldId id="323" r:id="rId13"/>
   </p:sldIdLst>
   <p:sldSz cx="12192000" cy="6858000"/>
   <p:notesSz cx="6858000" cy="9144000"/>
@@ -210,7 +211,7 @@
           <a:p>
             <a:fld id="{81C4B3FE-0320-8142-8396-5C3025C019EC}" type="datetimeFigureOut">
               <a:rPr lang="en-IT" smtClean="0"/>
-              <a:t>01/03/22</a:t>
+              <a:t>02/03/22</a:t>
             </a:fld>
             <a:endParaRPr lang="en-IT"/>
           </a:p>
@@ -796,6 +797,90 @@
             <a:fld id="{CC0F43FB-3F33-3F4B-9768-2FBED988F992}" type="slidenum">
               <a:rPr lang="en-IT" smtClean="0"/>
               <a:t>9</a:t>
+            </a:fld>
+            <a:endParaRPr lang="en-IT"/>
+          </a:p>
+        </p:txBody>
+      </p:sp>
+    </p:spTree>
+    <p:extLst>
+      <p:ext uri="{BB962C8B-B14F-4D97-AF65-F5344CB8AC3E}">
+        <p14:creationId xmlns:p14="http://schemas.microsoft.com/office/powerpoint/2010/main" val="3862677488"/>
+      </p:ext>
+    </p:extLst>
+  </p:cSld>
+  <p:clrMapOvr>
+    <a:masterClrMapping/>
+  </p:clrMapOvr>
+</p:notes>
+</file>
+
+<file path=ppt/notesSlides/notesSlide5.xml><?xml version="1.0" encoding="utf-8"?>
+<p:notes xmlns:a="http://schemas.openxmlformats.org/drawingml/2006/main" xmlns:r="http://schemas.openxmlformats.org/officeDocument/2006/relationships" xmlns:p="http://schemas.openxmlformats.org/presentationml/2006/main">
+  <p:cSld>
+    <p:spTree>
+      <p:nvGrpSpPr>
+        <p:cNvPr id="1" name=""/>
+        <p:cNvGrpSpPr/>
+        <p:nvPr/>
+      </p:nvGrpSpPr>
+      <p:grpSpPr>
+        <a:xfrm>
+          <a:off x="0" y="0"/>
+          <a:ext cx="0" cy="0"/>
+          <a:chOff x="0" y="0"/>
+          <a:chExt cx="0" cy="0"/>
+        </a:xfrm>
+      </p:grpSpPr>
+      <p:sp>
+        <p:nvSpPr>
+          <p:cNvPr id="2" name="Slide Image Placeholder 1"/>
+          <p:cNvSpPr>
+            <a:spLocks noGrp="1" noRot="1" noChangeAspect="1"/>
+          </p:cNvSpPr>
+          <p:nvPr>
+            <p:ph type="sldImg"/>
+          </p:nvPr>
+        </p:nvSpPr>
+        <p:spPr/>
+      </p:sp>
+      <p:sp>
+        <p:nvSpPr>
+          <p:cNvPr id="3" name="Notes Placeholder 2"/>
+          <p:cNvSpPr>
+            <a:spLocks noGrp="1"/>
+          </p:cNvSpPr>
+          <p:nvPr>
+            <p:ph type="body" idx="1"/>
+          </p:nvPr>
+        </p:nvSpPr>
+        <p:spPr/>
+        <p:txBody>
+          <a:bodyPr/>
+          <a:lstStyle/>
+          <a:p>
+            <a:endParaRPr lang="en-IT" dirty="0"/>
+          </a:p>
+        </p:txBody>
+      </p:sp>
+      <p:sp>
+        <p:nvSpPr>
+          <p:cNvPr id="4" name="Slide Number Placeholder 3"/>
+          <p:cNvSpPr>
+            <a:spLocks noGrp="1"/>
+          </p:cNvSpPr>
+          <p:nvPr>
+            <p:ph type="sldNum" sz="quarter" idx="5"/>
+          </p:nvPr>
+        </p:nvSpPr>
+        <p:spPr/>
+        <p:txBody>
+          <a:bodyPr/>
+          <a:lstStyle/>
+          <a:p>
+            <a:fld id="{CC0F43FB-3F33-3F4B-9768-2FBED988F992}" type="slidenum">
+              <a:rPr lang="en-IT" smtClean="0"/>
+              <a:t>10</a:t>
             </a:fld>
             <a:endParaRPr lang="en-IT"/>
           </a:p>
@@ -2905,7 +2990,7 @@
           <p:cNvPr id="2" name="Title 1">
             <a:extLst>
               <a:ext uri="{FF2B5EF4-FFF2-40B4-BE49-F238E27FC236}">
-                <a16:creationId xmlns:a16="http://schemas.microsoft.com/office/drawing/2014/main" id="{DCEB9E4F-F82C-A64F-809D-B943BB0A7B79}"/>
+                <a16:creationId xmlns:a16="http://schemas.microsoft.com/office/drawing/2014/main" id="{80BE60FB-C861-1E44-92E6-8F9396441CB2}"/>
               </a:ext>
             </a:extLst>
           </p:cNvPr>
@@ -2923,15 +3008,7 @@
           <a:p>
             <a:r>
               <a:rPr lang="en-IT" dirty="0"/>
-              <a:t>Install everything (P</a:t>
-            </a:r>
-            <a:r>
-              <a:rPr lang="en-GB" dirty="0"/>
-              <a:t>a</a:t>
-            </a:r>
-            <a:r>
-              <a:rPr lang="en-IT" dirty="0"/>
-              <a:t>rt 1)</a:t>
+              <a:t>The environment: VCS</a:t>
             </a:r>
           </a:p>
         </p:txBody>
@@ -2941,7 +3018,7 @@
           <p:cNvPr id="3" name="Content Placeholder 2">
             <a:extLst>
               <a:ext uri="{FF2B5EF4-FFF2-40B4-BE49-F238E27FC236}">
-                <a16:creationId xmlns:a16="http://schemas.microsoft.com/office/drawing/2014/main" id="{07EEA99A-73A7-F949-9D8F-EEED9045B6FA}"/>
+                <a16:creationId xmlns:a16="http://schemas.microsoft.com/office/drawing/2014/main" id="{ECD4BA52-23DB-D94D-9195-7777C71CD155}"/>
               </a:ext>
             </a:extLst>
           </p:cNvPr>
@@ -2949,13 +3026,13 @@
             <a:spLocks noGrp="1"/>
           </p:cNvSpPr>
           <p:nvPr>
-            <p:ph sz="half" idx="1"/>
+            <p:ph idx="1"/>
           </p:nvPr>
         </p:nvSpPr>
         <p:spPr>
           <a:xfrm>
-            <a:off x="428171" y="1364342"/>
-            <a:ext cx="11368313" cy="5331731"/>
+            <a:off x="428172" y="1361167"/>
+            <a:ext cx="11368314" cy="4981267"/>
           </a:xfrm>
         </p:spPr>
         <p:txBody>
@@ -2965,138 +3042,111 @@
           <a:lstStyle/>
           <a:p>
             <a:r>
-              <a:rPr lang="en-GB" dirty="0">
-                <a:ea typeface="Palatino" pitchFamily="2" charset="77"/>
-              </a:rPr>
-              <a:t>Do the following steps, in this order:</a:t>
-            </a:r>
-          </a:p>
-          <a:p>
-            <a:endParaRPr lang="en-GB" dirty="0">
-              <a:ea typeface="Palatino" pitchFamily="2" charset="77"/>
+              <a:rPr lang="en-IT" dirty="0"/>
+              <a:t>First check if it is already installed (~99% probability)</a:t>
+            </a:r>
+          </a:p>
+          <a:p>
+            <a:pPr lvl="1"/>
+            <a:r>
+              <a:rPr lang="en-IT" dirty="0"/>
+              <a:t>Open the Terminal &gt; Type </a:t>
+            </a:r>
+            <a:r>
+              <a:rPr lang="en-IT" dirty="0">
+                <a:latin typeface="Courier" pitchFamily="2" charset="0"/>
+              </a:rPr>
+              <a:t>“git --version”</a:t>
+            </a:r>
+          </a:p>
+          <a:p>
+            <a:pPr lvl="1"/>
+            <a:endParaRPr lang="en-IT" dirty="0">
+              <a:latin typeface="Courier" pitchFamily="2" charset="0"/>
             </a:endParaRPr>
           </a:p>
           <a:p>
             <a:pPr lvl="1"/>
-            <a:r>
-              <a:rPr lang="en-GB" b="1" dirty="0">
-                <a:ea typeface="Palatino" pitchFamily="2" charset="77"/>
-              </a:rPr>
-              <a:t>Step 1</a:t>
-            </a:r>
-            <a:r>
-              <a:rPr lang="en-GB" dirty="0">
-                <a:ea typeface="Palatino" pitchFamily="2" charset="77"/>
-              </a:rPr>
-              <a:t>: Install Flutter and Dart</a:t>
-            </a:r>
-          </a:p>
-          <a:p>
-            <a:pPr lvl="2"/>
-            <a:r>
-              <a:rPr lang="en-GB" dirty="0">
-                <a:ea typeface="Palatino" pitchFamily="2" charset="77"/>
-              </a:rPr>
-              <a:t>Go to &gt; </a:t>
-            </a:r>
-            <a:r>
-              <a:rPr lang="en-GB" dirty="0">
-                <a:ea typeface="Palatino" pitchFamily="2" charset="77"/>
-                <a:hlinkClick r:id="rId2"/>
-              </a:rPr>
-              <a:t>https://flutter.dev/docs/get-started/install</a:t>
-            </a:r>
-            <a:endParaRPr lang="en-GB" dirty="0">
-              <a:ea typeface="Palatino" pitchFamily="2" charset="77"/>
+            <a:endParaRPr lang="en-IT" dirty="0">
+              <a:latin typeface="Courier" pitchFamily="2" charset="0"/>
             </a:endParaRPr>
           </a:p>
           <a:p>
-            <a:pPr lvl="2"/>
-            <a:r>
-              <a:rPr lang="en-GB" dirty="0">
-                <a:ea typeface="Palatino" pitchFamily="2" charset="77"/>
-              </a:rPr>
-              <a:t>Follow the instructions…</a:t>
-            </a:r>
-          </a:p>
-          <a:p>
             <a:pPr lvl="1"/>
-            <a:r>
-              <a:rPr lang="en-GB" b="1" dirty="0">
-                <a:ea typeface="Palatino" pitchFamily="2" charset="77"/>
-              </a:rPr>
-              <a:t>Step 2</a:t>
-            </a:r>
-            <a:r>
-              <a:rPr lang="en-GB" dirty="0">
-                <a:ea typeface="Palatino" pitchFamily="2" charset="77"/>
-              </a:rPr>
-              <a:t>: Install OS support </a:t>
-            </a:r>
-          </a:p>
-          <a:p>
-            <a:pPr lvl="2"/>
-            <a:r>
-              <a:rPr lang="en-GB" dirty="0">
-                <a:ea typeface="Palatino" pitchFamily="2" charset="77"/>
-              </a:rPr>
-              <a:t>Same link as Step 1, just go ahead with the instructions until the end</a:t>
-            </a:r>
+            <a:endParaRPr lang="en-IT" dirty="0">
+              <a:latin typeface="Courier" pitchFamily="2" charset="0"/>
+            </a:endParaRPr>
           </a:p>
           <a:p>
             <a:pPr lvl="1"/>
-            <a:r>
-              <a:rPr lang="en-GB" b="1" dirty="0">
-                <a:ea typeface="Palatino" pitchFamily="2" charset="77"/>
-              </a:rPr>
-              <a:t>Step 3</a:t>
-            </a:r>
-            <a:r>
-              <a:rPr lang="en-GB" dirty="0">
-                <a:ea typeface="Palatino" pitchFamily="2" charset="77"/>
-              </a:rPr>
-              <a:t>: Install VS Code and integrate it with Flutter and Dart</a:t>
-            </a:r>
-          </a:p>
-          <a:p>
-            <a:pPr lvl="2"/>
+            <a:endParaRPr lang="en-IT" dirty="0">
+              <a:latin typeface="Courier" pitchFamily="2" charset="0"/>
+            </a:endParaRPr>
+          </a:p>
+          <a:p>
+            <a:pPr lvl="1"/>
+            <a:endParaRPr lang="en-IT" dirty="0">
+              <a:latin typeface="Courier" pitchFamily="2" charset="0"/>
+            </a:endParaRPr>
+          </a:p>
+          <a:p>
+            <a:pPr lvl="1"/>
+            <a:endParaRPr lang="en-IT" dirty="0">
+              <a:latin typeface="Courier" pitchFamily="2" charset="0"/>
+            </a:endParaRPr>
+          </a:p>
+          <a:p>
             <a:r>
               <a:rPr lang="en-IT" dirty="0">
                 <a:ea typeface="Palatino" pitchFamily="2" charset="77"/>
               </a:rPr>
-              <a:t>Go to &gt; </a:t>
-            </a:r>
-            <a:r>
-              <a:rPr lang="en-GB" dirty="0">
-                <a:ea typeface="Palatino" pitchFamily="2" charset="77"/>
-                <a:hlinkClick r:id="rId3"/>
-              </a:rPr>
-              <a:t>https://docs.flutter.dev/get-started/editor?tab=vscode</a:t>
-            </a:r>
-            <a:r>
-              <a:rPr lang="en-GB" dirty="0">
-                <a:ea typeface="Palatino" pitchFamily="2" charset="77"/>
-              </a:rPr>
-              <a:t> </a:t>
-            </a:r>
-          </a:p>
-          <a:p>
-            <a:pPr lvl="2"/>
-            <a:r>
-              <a:rPr lang="en-GB" dirty="0">
-                <a:ea typeface="Palatino" pitchFamily="2" charset="77"/>
-              </a:rPr>
-              <a:t>Follow the instructions…</a:t>
-            </a:r>
-          </a:p>
-        </p:txBody>
-      </p:sp>
+              <a:t>If an error appears you will need to install it (step 4 of slide 11). Otherwise, if you see the git version printed out, you can skip step 4 of slide 11.</a:t>
+            </a:r>
+          </a:p>
+        </p:txBody>
+      </p:sp>
+      <p:pic>
+        <p:nvPicPr>
+          <p:cNvPr id="5" name="Picture 4" descr="Graphical user interface, text&#10;&#10;Description automatically generated">
+            <a:extLst>
+              <a:ext uri="{FF2B5EF4-FFF2-40B4-BE49-F238E27FC236}">
+                <a16:creationId xmlns:a16="http://schemas.microsoft.com/office/drawing/2014/main" id="{F57812B3-D3B9-7242-8271-8BD9E96C72A7}"/>
+              </a:ext>
+            </a:extLst>
+          </p:cNvPr>
+          <p:cNvPicPr>
+            <a:picLocks noChangeAspect="1"/>
+          </p:cNvPicPr>
+          <p:nvPr/>
+        </p:nvPicPr>
+        <p:blipFill>
+          <a:blip r:embed="rId3">
+            <a:extLst>
+              <a:ext uri="{28A0092B-C50C-407E-A947-70E740481C1C}">
+                <a14:useLocalDpi xmlns:a14="http://schemas.microsoft.com/office/drawing/2010/main" val="0"/>
+              </a:ext>
+            </a:extLst>
+          </a:blip>
+          <a:stretch>
+            <a:fillRect/>
+          </a:stretch>
+        </p:blipFill>
+        <p:spPr>
+          <a:xfrm>
+            <a:off x="1914705" y="2175513"/>
+            <a:ext cx="7387625" cy="1551178"/>
+          </a:xfrm>
+          <a:prstGeom prst="rect">
+            <a:avLst/>
+          </a:prstGeom>
+        </p:spPr>
+      </p:pic>
       <p:sp>
         <p:nvSpPr>
           <p:cNvPr id="4" name="Slide Number Placeholder 3">
             <a:extLst>
               <a:ext uri="{FF2B5EF4-FFF2-40B4-BE49-F238E27FC236}">
-                <a16:creationId xmlns:a16="http://schemas.microsoft.com/office/drawing/2014/main" id="{ED05C487-70B4-174B-A325-CCA9C11792FF}"/>
+                <a16:creationId xmlns:a16="http://schemas.microsoft.com/office/drawing/2014/main" id="{FE01D888-710A-A44E-9C8F-17860AB7053F}"/>
               </a:ext>
             </a:extLst>
           </p:cNvPr>
@@ -3116,14 +3166,14 @@
               <a:rPr lang="en-GB" smtClean="0"/>
               <a:t>10</a:t>
             </a:fld>
-            <a:endParaRPr lang="en-GB"/>
+            <a:endParaRPr lang="en-GB" dirty="0"/>
           </a:p>
         </p:txBody>
       </p:sp>
     </p:spTree>
     <p:extLst>
       <p:ext uri="{BB962C8B-B14F-4D97-AF65-F5344CB8AC3E}">
-        <p14:creationId xmlns:p14="http://schemas.microsoft.com/office/powerpoint/2010/main" val="3147511355"/>
+        <p14:creationId xmlns:p14="http://schemas.microsoft.com/office/powerpoint/2010/main" val="2480795809"/>
       </p:ext>
     </p:extLst>
   </p:cSld>
@@ -3173,7 +3223,15 @@
           <a:p>
             <a:r>
               <a:rPr lang="en-IT" dirty="0"/>
-              <a:t>Install everything (Part 2)</a:t>
+              <a:t>Install everything (P</a:t>
+            </a:r>
+            <a:r>
+              <a:rPr lang="en-GB" dirty="0"/>
+              <a:t>a</a:t>
+            </a:r>
+            <a:r>
+              <a:rPr lang="en-IT" dirty="0"/>
+              <a:t>rt 1)</a:t>
             </a:r>
           </a:p>
         </p:txBody>
@@ -3224,19 +3282,19 @@
               <a:rPr lang="en-GB" b="1" dirty="0">
                 <a:ea typeface="Palatino" pitchFamily="2" charset="77"/>
               </a:rPr>
-              <a:t>Step 4</a:t>
+              <a:t>Step 1</a:t>
             </a:r>
             <a:r>
               <a:rPr lang="en-GB" dirty="0">
                 <a:ea typeface="Palatino" pitchFamily="2" charset="77"/>
               </a:rPr>
-              <a:t>: Install GIT </a:t>
+              <a:t>: Install Flutter and Dart</a:t>
             </a:r>
           </a:p>
           <a:p>
             <a:pPr lvl="2"/>
             <a:r>
-              <a:rPr lang="en-IT" dirty="0">
+              <a:rPr lang="en-GB" dirty="0">
                 <a:ea typeface="Palatino" pitchFamily="2" charset="77"/>
               </a:rPr>
               <a:t>Go to &gt; </a:t>
@@ -3246,7 +3304,7 @@
                 <a:ea typeface="Palatino" pitchFamily="2" charset="77"/>
                 <a:hlinkClick r:id="rId2"/>
               </a:rPr>
-              <a:t>https://git-scm.com/book/en/v2/Getting-Started-Installing-Git</a:t>
+              <a:t>https://flutter.dev/docs/get-started/install</a:t>
             </a:r>
             <a:endParaRPr lang="en-GB" dirty="0">
               <a:ea typeface="Palatino" pitchFamily="2" charset="77"/>
@@ -3259,140 +3317,6 @@
                 <a:ea typeface="Palatino" pitchFamily="2" charset="77"/>
               </a:rPr>
               <a:t>Follow the instructions…</a:t>
-            </a:r>
-          </a:p>
-          <a:p>
-            <a:pPr lvl="2"/>
-            <a:r>
-              <a:rPr lang="en-GB" dirty="0">
-                <a:ea typeface="Palatino" pitchFamily="2" charset="77"/>
-              </a:rPr>
-              <a:t>After the installation, open the terminal and run the two following commands:</a:t>
-            </a:r>
-            <a:br>
-              <a:rPr lang="en-GB" dirty="0">
-                <a:ea typeface="Palatino" pitchFamily="2" charset="77"/>
-              </a:rPr>
-            </a:br>
-            <a:r>
-              <a:rPr lang="en-GB" dirty="0">
-                <a:latin typeface="Courier" pitchFamily="2" charset="0"/>
-                <a:ea typeface="Palatino" pitchFamily="2" charset="77"/>
-              </a:rPr>
-              <a:t>git config --global </a:t>
-            </a:r>
-            <a:r>
-              <a:rPr lang="en-GB" dirty="0" err="1">
-                <a:latin typeface="Courier" pitchFamily="2" charset="0"/>
-                <a:ea typeface="Palatino" pitchFamily="2" charset="77"/>
-              </a:rPr>
-              <a:t>user.name</a:t>
-            </a:r>
-            <a:r>
-              <a:rPr lang="en-GB" dirty="0">
-                <a:latin typeface="Courier" pitchFamily="2" charset="0"/>
-                <a:ea typeface="Palatino" pitchFamily="2" charset="77"/>
-              </a:rPr>
-              <a:t> ”FirstName </a:t>
-            </a:r>
-            <a:r>
-              <a:rPr lang="en-GB" dirty="0" err="1">
-                <a:latin typeface="Courier" pitchFamily="2" charset="0"/>
-                <a:ea typeface="Palatino" pitchFamily="2" charset="77"/>
-              </a:rPr>
-              <a:t>LastName</a:t>
-            </a:r>
-            <a:r>
-              <a:rPr lang="en-GB" dirty="0">
-                <a:latin typeface="Courier" pitchFamily="2" charset="0"/>
-                <a:ea typeface="Palatino" pitchFamily="2" charset="77"/>
-              </a:rPr>
-              <a:t>” </a:t>
-            </a:r>
-            <a:r>
-              <a:rPr lang="en-GB" dirty="0">
-                <a:ea typeface="Palatino" pitchFamily="2" charset="77"/>
-              </a:rPr>
-              <a:t>(where FirstName and </a:t>
-            </a:r>
-            <a:r>
-              <a:rPr lang="en-GB" dirty="0" err="1">
-                <a:ea typeface="Palatino" pitchFamily="2" charset="77"/>
-              </a:rPr>
-              <a:t>LastName</a:t>
-            </a:r>
-            <a:r>
-              <a:rPr lang="en-GB" dirty="0">
-                <a:ea typeface="Palatino" pitchFamily="2" charset="77"/>
-              </a:rPr>
-              <a:t> are your actual first name and last name, e.g., Giacomo Cappon)</a:t>
-            </a:r>
-            <a:br>
-              <a:rPr lang="en-GB" dirty="0">
-                <a:ea typeface="Palatino" pitchFamily="2" charset="77"/>
-              </a:rPr>
-            </a:br>
-            <a:r>
-              <a:rPr lang="en-GB" dirty="0">
-                <a:latin typeface="Courier" pitchFamily="2" charset="0"/>
-                <a:ea typeface="Palatino" pitchFamily="2" charset="77"/>
-              </a:rPr>
-              <a:t>git config --global </a:t>
-            </a:r>
-            <a:r>
-              <a:rPr lang="en-GB" dirty="0" err="1">
-                <a:latin typeface="Courier" pitchFamily="2" charset="0"/>
-                <a:ea typeface="Palatino" pitchFamily="2" charset="77"/>
-              </a:rPr>
-              <a:t>user.email</a:t>
-            </a:r>
-            <a:r>
-              <a:rPr lang="en-GB" dirty="0">
-                <a:latin typeface="Courier" pitchFamily="2" charset="0"/>
-                <a:ea typeface="Palatino" pitchFamily="2" charset="77"/>
-              </a:rPr>
-              <a:t> ”</a:t>
-            </a:r>
-            <a:r>
-              <a:rPr lang="en-GB" dirty="0" err="1">
-                <a:latin typeface="Courier" pitchFamily="2" charset="0"/>
-                <a:ea typeface="Palatino" pitchFamily="2" charset="77"/>
-              </a:rPr>
-              <a:t>email@domain.com</a:t>
-            </a:r>
-            <a:r>
-              <a:rPr lang="en-GB" dirty="0">
-                <a:latin typeface="Courier" pitchFamily="2" charset="0"/>
-                <a:ea typeface="Palatino" pitchFamily="2" charset="77"/>
-              </a:rPr>
-              <a:t>” </a:t>
-            </a:r>
-            <a:r>
-              <a:rPr lang="en-GB" dirty="0">
-                <a:ea typeface="Palatino" pitchFamily="2" charset="77"/>
-              </a:rPr>
-              <a:t>(where </a:t>
-            </a:r>
-            <a:r>
-              <a:rPr lang="en-GB" dirty="0">
-                <a:latin typeface="Courier" pitchFamily="2" charset="0"/>
-                <a:ea typeface="Palatino" pitchFamily="2" charset="77"/>
-                <a:hlinkClick r:id="rId3"/>
-              </a:rPr>
-              <a:t>email@domain.com</a:t>
-            </a:r>
-            <a:r>
-              <a:rPr lang="en-GB" dirty="0">
-                <a:latin typeface="Courier" pitchFamily="2" charset="0"/>
-                <a:ea typeface="Palatino" pitchFamily="2" charset="77"/>
-              </a:rPr>
-              <a:t> </a:t>
-            </a:r>
-            <a:r>
-              <a:rPr lang="en-GB" dirty="0">
-                <a:ea typeface="Palatino" pitchFamily="2" charset="77"/>
-              </a:rPr>
-              <a:t>is the email you want to use as identifier. For simplicity, use the same email you will use to create the GitHub account)</a:t>
             </a:r>
           </a:p>
           <a:p>
@@ -3407,13 +3331,13 @@
               <a:rPr lang="en-GB" b="1" dirty="0">
                 <a:ea typeface="Palatino" pitchFamily="2" charset="77"/>
               </a:rPr>
-              <a:t>Step 5</a:t>
+              <a:t>Step 2</a:t>
             </a:r>
             <a:r>
               <a:rPr lang="en-GB" dirty="0">
                 <a:ea typeface="Palatino" pitchFamily="2" charset="77"/>
               </a:rPr>
-              <a:t>: Test that everything is working</a:t>
+              <a:t>: Install OS support </a:t>
             </a:r>
           </a:p>
           <a:p>
@@ -3422,14 +3346,44 @@
               <a:rPr lang="en-GB" dirty="0">
                 <a:ea typeface="Palatino" pitchFamily="2" charset="77"/>
               </a:rPr>
+              <a:t>Same link as Step 1, just go ahead with the instructions until the end</a:t>
+            </a:r>
+          </a:p>
+          <a:p>
+            <a:pPr lvl="2"/>
+            <a:endParaRPr lang="en-GB" dirty="0">
+              <a:ea typeface="Palatino" pitchFamily="2" charset="77"/>
+            </a:endParaRPr>
+          </a:p>
+          <a:p>
+            <a:pPr lvl="1"/>
+            <a:r>
+              <a:rPr lang="en-GB" b="1" dirty="0">
+                <a:ea typeface="Palatino" pitchFamily="2" charset="77"/>
+              </a:rPr>
+              <a:t>Step 3</a:t>
+            </a:r>
+            <a:r>
+              <a:rPr lang="en-GB" dirty="0">
+                <a:ea typeface="Palatino" pitchFamily="2" charset="77"/>
+              </a:rPr>
+              <a:t>: Install VS Code and integrate it with Flutter and Dart</a:t>
+            </a:r>
+          </a:p>
+          <a:p>
+            <a:pPr lvl="2"/>
+            <a:r>
+              <a:rPr lang="en-IT" dirty="0">
+                <a:ea typeface="Palatino" pitchFamily="2" charset="77"/>
+              </a:rPr>
               <a:t>Go to &gt; </a:t>
             </a:r>
             <a:r>
               <a:rPr lang="en-GB" dirty="0">
                 <a:ea typeface="Palatino" pitchFamily="2" charset="77"/>
-                <a:hlinkClick r:id="rId4"/>
-              </a:rPr>
-              <a:t>https://docs.flutter.dev/get-started/test-drive?tab=vscode</a:t>
+                <a:hlinkClick r:id="rId3"/>
+              </a:rPr>
+              <a:t>https://docs.flutter.dev/get-started/editor?tab=vscode</a:t>
             </a:r>
             <a:r>
               <a:rPr lang="en-GB" dirty="0">
@@ -3473,6 +3427,428 @@
             <a:fld id="{31DE2C5B-556E-47B8-A792-024C2FCA4ACC}" type="slidenum">
               <a:rPr lang="en-GB" smtClean="0"/>
               <a:t>11</a:t>
+            </a:fld>
+            <a:endParaRPr lang="en-GB"/>
+          </a:p>
+        </p:txBody>
+      </p:sp>
+    </p:spTree>
+    <p:extLst>
+      <p:ext uri="{BB962C8B-B14F-4D97-AF65-F5344CB8AC3E}">
+        <p14:creationId xmlns:p14="http://schemas.microsoft.com/office/powerpoint/2010/main" val="3147511355"/>
+      </p:ext>
+    </p:extLst>
+  </p:cSld>
+  <p:clrMapOvr>
+    <a:masterClrMapping/>
+  </p:clrMapOvr>
+</p:sld>
+</file>
+
+<file path=ppt/slides/slide12.xml><?xml version="1.0" encoding="utf-8"?>
+<p:sld xmlns:a="http://schemas.openxmlformats.org/drawingml/2006/main" xmlns:r="http://schemas.openxmlformats.org/officeDocument/2006/relationships" xmlns:p="http://schemas.openxmlformats.org/presentationml/2006/main">
+  <p:cSld>
+    <p:spTree>
+      <p:nvGrpSpPr>
+        <p:cNvPr id="1" name=""/>
+        <p:cNvGrpSpPr/>
+        <p:nvPr/>
+      </p:nvGrpSpPr>
+      <p:grpSpPr>
+        <a:xfrm>
+          <a:off x="0" y="0"/>
+          <a:ext cx="0" cy="0"/>
+          <a:chOff x="0" y="0"/>
+          <a:chExt cx="0" cy="0"/>
+        </a:xfrm>
+      </p:grpSpPr>
+      <p:sp>
+        <p:nvSpPr>
+          <p:cNvPr id="2" name="Title 1">
+            <a:extLst>
+              <a:ext uri="{FF2B5EF4-FFF2-40B4-BE49-F238E27FC236}">
+                <a16:creationId xmlns:a16="http://schemas.microsoft.com/office/drawing/2014/main" id="{DCEB9E4F-F82C-A64F-809D-B943BB0A7B79}"/>
+              </a:ext>
+            </a:extLst>
+          </p:cNvPr>
+          <p:cNvSpPr>
+            <a:spLocks noGrp="1"/>
+          </p:cNvSpPr>
+          <p:nvPr>
+            <p:ph type="title"/>
+          </p:nvPr>
+        </p:nvSpPr>
+        <p:spPr/>
+        <p:txBody>
+          <a:bodyPr/>
+          <a:lstStyle/>
+          <a:p>
+            <a:r>
+              <a:rPr lang="en-IT" dirty="0"/>
+              <a:t>Install everything (Part 2)</a:t>
+            </a:r>
+          </a:p>
+        </p:txBody>
+      </p:sp>
+      <p:sp>
+        <p:nvSpPr>
+          <p:cNvPr id="3" name="Content Placeholder 2">
+            <a:extLst>
+              <a:ext uri="{FF2B5EF4-FFF2-40B4-BE49-F238E27FC236}">
+                <a16:creationId xmlns:a16="http://schemas.microsoft.com/office/drawing/2014/main" id="{07EEA99A-73A7-F949-9D8F-EEED9045B6FA}"/>
+              </a:ext>
+            </a:extLst>
+          </p:cNvPr>
+          <p:cNvSpPr>
+            <a:spLocks noGrp="1"/>
+          </p:cNvSpPr>
+          <p:nvPr>
+            <p:ph sz="half" idx="1"/>
+          </p:nvPr>
+        </p:nvSpPr>
+        <p:spPr>
+          <a:xfrm>
+            <a:off x="428171" y="1364342"/>
+            <a:ext cx="11368313" cy="5331731"/>
+          </a:xfrm>
+        </p:spPr>
+        <p:txBody>
+          <a:bodyPr>
+            <a:normAutofit fontScale="92500" lnSpcReduction="10000"/>
+          </a:bodyPr>
+          <a:lstStyle/>
+          <a:p>
+            <a:r>
+              <a:rPr lang="en-GB" dirty="0">
+                <a:ea typeface="Palatino" pitchFamily="2" charset="77"/>
+              </a:rPr>
+              <a:t>Do the following steps, in this order:</a:t>
+            </a:r>
+          </a:p>
+          <a:p>
+            <a:endParaRPr lang="en-GB" dirty="0">
+              <a:ea typeface="Palatino" pitchFamily="2" charset="77"/>
+            </a:endParaRPr>
+          </a:p>
+          <a:p>
+            <a:pPr lvl="1"/>
+            <a:r>
+              <a:rPr lang="en-GB" b="1" dirty="0">
+                <a:ea typeface="Palatino" pitchFamily="2" charset="77"/>
+              </a:rPr>
+              <a:t>Step 4</a:t>
+            </a:r>
+            <a:r>
+              <a:rPr lang="en-GB" dirty="0">
+                <a:ea typeface="Palatino" pitchFamily="2" charset="77"/>
+              </a:rPr>
+              <a:t>: Install GIT </a:t>
+            </a:r>
+          </a:p>
+          <a:p>
+            <a:pPr lvl="2"/>
+            <a:r>
+              <a:rPr lang="en-IT" dirty="0">
+                <a:ea typeface="Palatino" pitchFamily="2" charset="77"/>
+              </a:rPr>
+              <a:t>Go to &gt; </a:t>
+            </a:r>
+            <a:r>
+              <a:rPr lang="en-GB" dirty="0">
+                <a:ea typeface="Palatino" pitchFamily="2" charset="77"/>
+                <a:hlinkClick r:id="rId2"/>
+              </a:rPr>
+              <a:t>https://git-scm.com/book/en/v2/Getting-Started-Installing-Git</a:t>
+            </a:r>
+            <a:endParaRPr lang="en-GB" dirty="0">
+              <a:ea typeface="Palatino" pitchFamily="2" charset="77"/>
+            </a:endParaRPr>
+          </a:p>
+          <a:p>
+            <a:pPr lvl="2"/>
+            <a:r>
+              <a:rPr lang="en-GB" dirty="0">
+                <a:ea typeface="Palatino" pitchFamily="2" charset="77"/>
+              </a:rPr>
+              <a:t>Follow the instructions…</a:t>
+            </a:r>
+          </a:p>
+          <a:p>
+            <a:pPr lvl="2"/>
+            <a:r>
+              <a:rPr lang="en-GB" b="1" dirty="0">
+                <a:ea typeface="Palatino" pitchFamily="2" charset="77"/>
+              </a:rPr>
+              <a:t>Step 4b (for Windows users only)</a:t>
+            </a:r>
+            <a:r>
+              <a:rPr lang="en-GB" dirty="0">
+                <a:ea typeface="Palatino" pitchFamily="2" charset="77"/>
+              </a:rPr>
+              <a:t>: Install GIT Bash</a:t>
+            </a:r>
+          </a:p>
+          <a:p>
+            <a:pPr lvl="3"/>
+            <a:r>
+              <a:rPr lang="en-GB" dirty="0">
+                <a:ea typeface="Palatino" pitchFamily="2" charset="77"/>
+              </a:rPr>
+              <a:t>Go to &gt; </a:t>
+            </a:r>
+            <a:r>
+              <a:rPr lang="en-GB" dirty="0">
+                <a:ea typeface="Palatino" pitchFamily="2" charset="77"/>
+                <a:hlinkClick r:id="rId3"/>
+              </a:rPr>
+              <a:t>https://gitforwindows.org/</a:t>
+            </a:r>
+            <a:r>
+              <a:rPr lang="en-GB" dirty="0">
+                <a:ea typeface="Palatino" pitchFamily="2" charset="77"/>
+              </a:rPr>
+              <a:t> </a:t>
+            </a:r>
+          </a:p>
+          <a:p>
+            <a:pPr lvl="3"/>
+            <a:r>
+              <a:rPr lang="en-GB" dirty="0">
+                <a:ea typeface="Palatino" pitchFamily="2" charset="77"/>
+              </a:rPr>
+              <a:t>Click the Download button</a:t>
+            </a:r>
+          </a:p>
+          <a:p>
+            <a:pPr lvl="3"/>
+            <a:r>
+              <a:rPr lang="en-GB" dirty="0">
+                <a:ea typeface="Palatino" pitchFamily="2" charset="77"/>
+              </a:rPr>
+              <a:t>Download and install </a:t>
+            </a:r>
+            <a:r>
+              <a:rPr lang="en-GB" dirty="0"/>
+              <a:t>Git-2.35.1.2-64-bit.exe </a:t>
+            </a:r>
+            <a:endParaRPr lang="en-GB" dirty="0">
+              <a:ea typeface="Palatino" pitchFamily="2" charset="77"/>
+            </a:endParaRPr>
+          </a:p>
+          <a:p>
+            <a:pPr lvl="2"/>
+            <a:r>
+              <a:rPr lang="en-GB" dirty="0">
+                <a:ea typeface="Palatino" pitchFamily="2" charset="77"/>
+              </a:rPr>
+              <a:t>After the installation, open the terminal and run the two following commands:</a:t>
+            </a:r>
+            <a:br>
+              <a:rPr lang="en-GB" dirty="0">
+                <a:ea typeface="Palatino" pitchFamily="2" charset="77"/>
+              </a:rPr>
+            </a:br>
+            <a:r>
+              <a:rPr lang="en-GB" dirty="0">
+                <a:latin typeface="Courier" pitchFamily="2" charset="0"/>
+                <a:ea typeface="Palatino" pitchFamily="2" charset="77"/>
+              </a:rPr>
+              <a:t>git config --global </a:t>
+            </a:r>
+            <a:r>
+              <a:rPr lang="en-GB" dirty="0" err="1">
+                <a:latin typeface="Courier" pitchFamily="2" charset="0"/>
+                <a:ea typeface="Palatino" pitchFamily="2" charset="77"/>
+              </a:rPr>
+              <a:t>user.name</a:t>
+            </a:r>
+            <a:r>
+              <a:rPr lang="en-GB" dirty="0">
+                <a:latin typeface="Courier" pitchFamily="2" charset="0"/>
+                <a:ea typeface="Palatino" pitchFamily="2" charset="77"/>
+              </a:rPr>
+              <a:t> ”FirstName </a:t>
+            </a:r>
+            <a:r>
+              <a:rPr lang="en-GB" dirty="0" err="1">
+                <a:latin typeface="Courier" pitchFamily="2" charset="0"/>
+                <a:ea typeface="Palatino" pitchFamily="2" charset="77"/>
+              </a:rPr>
+              <a:t>LastName</a:t>
+            </a:r>
+            <a:r>
+              <a:rPr lang="en-GB" dirty="0">
+                <a:latin typeface="Courier" pitchFamily="2" charset="0"/>
+                <a:ea typeface="Palatino" pitchFamily="2" charset="77"/>
+              </a:rPr>
+              <a:t>” </a:t>
+            </a:r>
+            <a:r>
+              <a:rPr lang="en-GB" dirty="0">
+                <a:ea typeface="Palatino" pitchFamily="2" charset="77"/>
+              </a:rPr>
+              <a:t>(where FirstName and </a:t>
+            </a:r>
+            <a:r>
+              <a:rPr lang="en-GB" dirty="0" err="1">
+                <a:ea typeface="Palatino" pitchFamily="2" charset="77"/>
+              </a:rPr>
+              <a:t>LastName</a:t>
+            </a:r>
+            <a:r>
+              <a:rPr lang="en-GB" dirty="0">
+                <a:ea typeface="Palatino" pitchFamily="2" charset="77"/>
+              </a:rPr>
+              <a:t> are your actual first name and last name, e.g., Giacomo Cappon)</a:t>
+            </a:r>
+            <a:br>
+              <a:rPr lang="en-GB" dirty="0">
+                <a:ea typeface="Palatino" pitchFamily="2" charset="77"/>
+              </a:rPr>
+            </a:br>
+            <a:r>
+              <a:rPr lang="en-GB" dirty="0">
+                <a:latin typeface="Courier" pitchFamily="2" charset="0"/>
+                <a:ea typeface="Palatino" pitchFamily="2" charset="77"/>
+              </a:rPr>
+              <a:t>git config --global </a:t>
+            </a:r>
+            <a:r>
+              <a:rPr lang="en-GB" dirty="0" err="1">
+                <a:latin typeface="Courier" pitchFamily="2" charset="0"/>
+                <a:ea typeface="Palatino" pitchFamily="2" charset="77"/>
+              </a:rPr>
+              <a:t>user.email</a:t>
+            </a:r>
+            <a:r>
+              <a:rPr lang="en-GB" dirty="0">
+                <a:latin typeface="Courier" pitchFamily="2" charset="0"/>
+                <a:ea typeface="Palatino" pitchFamily="2" charset="77"/>
+              </a:rPr>
+              <a:t> ”</a:t>
+            </a:r>
+            <a:r>
+              <a:rPr lang="en-GB" dirty="0" err="1">
+                <a:latin typeface="Courier" pitchFamily="2" charset="0"/>
+                <a:ea typeface="Palatino" pitchFamily="2" charset="77"/>
+              </a:rPr>
+              <a:t>email@domain.com</a:t>
+            </a:r>
+            <a:r>
+              <a:rPr lang="en-GB" dirty="0">
+                <a:latin typeface="Courier" pitchFamily="2" charset="0"/>
+                <a:ea typeface="Palatino" pitchFamily="2" charset="77"/>
+              </a:rPr>
+              <a:t>” </a:t>
+            </a:r>
+            <a:r>
+              <a:rPr lang="en-GB" dirty="0">
+                <a:ea typeface="Palatino" pitchFamily="2" charset="77"/>
+              </a:rPr>
+              <a:t>(where </a:t>
+            </a:r>
+            <a:r>
+              <a:rPr lang="en-GB" dirty="0">
+                <a:latin typeface="Courier" pitchFamily="2" charset="0"/>
+                <a:ea typeface="Palatino" pitchFamily="2" charset="77"/>
+                <a:hlinkClick r:id="rId4"/>
+              </a:rPr>
+              <a:t>email@domain.com</a:t>
+            </a:r>
+            <a:r>
+              <a:rPr lang="en-GB" dirty="0">
+                <a:latin typeface="Courier" pitchFamily="2" charset="0"/>
+                <a:ea typeface="Palatino" pitchFamily="2" charset="77"/>
+              </a:rPr>
+              <a:t> </a:t>
+            </a:r>
+            <a:r>
+              <a:rPr lang="en-GB" dirty="0">
+                <a:ea typeface="Palatino" pitchFamily="2" charset="77"/>
+              </a:rPr>
+              <a:t>is the email you want to use as identifier. For simplicity, use the same email you will use to create the GitHub account)</a:t>
+            </a:r>
+          </a:p>
+          <a:p>
+            <a:pPr marL="914400" lvl="2" indent="0">
+              <a:buNone/>
+            </a:pPr>
+            <a:endParaRPr lang="en-GB" dirty="0">
+              <a:ea typeface="Palatino" pitchFamily="2" charset="77"/>
+            </a:endParaRPr>
+          </a:p>
+          <a:p>
+            <a:pPr lvl="1"/>
+            <a:r>
+              <a:rPr lang="en-GB" b="1" dirty="0">
+                <a:ea typeface="Palatino" pitchFamily="2" charset="77"/>
+              </a:rPr>
+              <a:t>Step 5</a:t>
+            </a:r>
+            <a:r>
+              <a:rPr lang="en-GB" dirty="0">
+                <a:ea typeface="Palatino" pitchFamily="2" charset="77"/>
+              </a:rPr>
+              <a:t>: Test that everything is working</a:t>
+            </a:r>
+          </a:p>
+          <a:p>
+            <a:pPr lvl="2"/>
+            <a:r>
+              <a:rPr lang="en-GB" dirty="0">
+                <a:ea typeface="Palatino" pitchFamily="2" charset="77"/>
+              </a:rPr>
+              <a:t>Go to &gt; </a:t>
+            </a:r>
+            <a:r>
+              <a:rPr lang="en-GB" dirty="0">
+                <a:ea typeface="Palatino" pitchFamily="2" charset="77"/>
+                <a:hlinkClick r:id="rId5"/>
+              </a:rPr>
+              <a:t>https://docs.flutter.dev/get-started/test-drive?tab=vscode</a:t>
+            </a:r>
+            <a:r>
+              <a:rPr lang="en-GB" dirty="0">
+                <a:ea typeface="Palatino" pitchFamily="2" charset="77"/>
+              </a:rPr>
+              <a:t> </a:t>
+            </a:r>
+          </a:p>
+          <a:p>
+            <a:pPr lvl="2"/>
+            <a:r>
+              <a:rPr lang="en-GB" dirty="0">
+                <a:ea typeface="Palatino" pitchFamily="2" charset="77"/>
+              </a:rPr>
+              <a:t>Follow the instructions…</a:t>
+            </a:r>
+          </a:p>
+        </p:txBody>
+      </p:sp>
+      <p:sp>
+        <p:nvSpPr>
+          <p:cNvPr id="4" name="Slide Number Placeholder 3">
+            <a:extLst>
+              <a:ext uri="{FF2B5EF4-FFF2-40B4-BE49-F238E27FC236}">
+                <a16:creationId xmlns:a16="http://schemas.microsoft.com/office/drawing/2014/main" id="{ED05C487-70B4-174B-A325-CCA9C11792FF}"/>
+              </a:ext>
+            </a:extLst>
+          </p:cNvPr>
+          <p:cNvSpPr>
+            <a:spLocks noGrp="1"/>
+          </p:cNvSpPr>
+          <p:nvPr>
+            <p:ph type="sldNum" sz="quarter" idx="12"/>
+          </p:nvPr>
+        </p:nvSpPr>
+        <p:spPr/>
+        <p:txBody>
+          <a:bodyPr/>
+          <a:lstStyle/>
+          <a:p>
+            <a:fld id="{31DE2C5B-556E-47B8-A792-024C2FCA4ACC}" type="slidenum">
+              <a:rPr lang="en-GB" smtClean="0"/>
+              <a:t>12</a:t>
             </a:fld>
             <a:endParaRPr lang="en-GB"/>
           </a:p>
@@ -5209,7 +5585,7 @@
         </p:spPr>
         <p:txBody>
           <a:bodyPr>
-            <a:normAutofit fontScale="92500" lnSpcReduction="20000"/>
+            <a:normAutofit fontScale="92500" lnSpcReduction="10000"/>
           </a:bodyPr>
           <a:lstStyle/>
           <a:p>
@@ -5293,20 +5669,6 @@
             <a:endParaRPr lang="en-GB" dirty="0">
               <a:ea typeface="Palatino" pitchFamily="2" charset="77"/>
             </a:endParaRPr>
-          </a:p>
-          <a:p>
-            <a:pPr lvl="1"/>
-            <a:endParaRPr lang="en-GB" dirty="0">
-              <a:ea typeface="Palatino" pitchFamily="2" charset="77"/>
-            </a:endParaRPr>
-          </a:p>
-          <a:p>
-            <a:r>
-              <a:rPr lang="en-GB" dirty="0">
-                <a:ea typeface="Palatino" pitchFamily="2" charset="77"/>
-              </a:rPr>
-              <a:t>To install Flutter and Dart </a:t>
-            </a:r>
           </a:p>
         </p:txBody>
       </p:sp>
@@ -6492,7 +6854,7 @@
           <p:cNvPr id="2" name="Title 1">
             <a:extLst>
               <a:ext uri="{FF2B5EF4-FFF2-40B4-BE49-F238E27FC236}">
-                <a16:creationId xmlns:a16="http://schemas.microsoft.com/office/drawing/2014/main" id="{80BE60FB-C861-1E44-92E6-8F9396441CB2}"/>
+                <a16:creationId xmlns:a16="http://schemas.microsoft.com/office/drawing/2014/main" id="{DCEB9E4F-F82C-A64F-809D-B943BB0A7B79}"/>
               </a:ext>
             </a:extLst>
           </p:cNvPr>
@@ -6510,7 +6872,7 @@
           <a:p>
             <a:r>
               <a:rPr lang="en-IT" dirty="0"/>
-              <a:t>The environment: VCS</a:t>
+              <a:t>The environment: Git-Bash (for Windows users)</a:t>
             </a:r>
           </a:p>
         </p:txBody>
@@ -6520,7 +6882,7 @@
           <p:cNvPr id="3" name="Content Placeholder 2">
             <a:extLst>
               <a:ext uri="{FF2B5EF4-FFF2-40B4-BE49-F238E27FC236}">
-                <a16:creationId xmlns:a16="http://schemas.microsoft.com/office/drawing/2014/main" id="{ECD4BA52-23DB-D94D-9195-7777C71CD155}"/>
+                <a16:creationId xmlns:a16="http://schemas.microsoft.com/office/drawing/2014/main" id="{07EEA99A-73A7-F949-9D8F-EEED9045B6FA}"/>
               </a:ext>
             </a:extLst>
           </p:cNvPr>
@@ -6528,13 +6890,13 @@
             <a:spLocks noGrp="1"/>
           </p:cNvSpPr>
           <p:nvPr>
-            <p:ph idx="1"/>
+            <p:ph sz="half" idx="1"/>
           </p:nvPr>
         </p:nvSpPr>
         <p:spPr>
           <a:xfrm>
-            <a:off x="428172" y="1361167"/>
-            <a:ext cx="11368314" cy="4981267"/>
+            <a:off x="428172" y="1364343"/>
+            <a:ext cx="7976526" cy="4812620"/>
           </a:xfrm>
         </p:spPr>
         <p:txBody>
@@ -6544,75 +6906,158 @@
           <a:lstStyle/>
           <a:p>
             <a:r>
-              <a:rPr lang="en-IT" dirty="0"/>
-              <a:t>First check if it is already installed (~99% probability)</a:t>
+              <a:rPr lang="en-GB" dirty="0">
+                <a:ea typeface="Palatino" pitchFamily="2" charset="77"/>
+              </a:rPr>
+              <a:t>You will work with GIT from the command line: </a:t>
             </a:r>
           </a:p>
           <a:p>
             <a:pPr lvl="1"/>
             <a:r>
-              <a:rPr lang="en-IT" dirty="0"/>
-              <a:t>Open the Terminal &gt; Type </a:t>
-            </a:r>
-            <a:r>
-              <a:rPr lang="en-IT" dirty="0">
-                <a:latin typeface="Courier" pitchFamily="2" charset="0"/>
-              </a:rPr>
-              <a:t>“git --version”</a:t>
+              <a:rPr lang="en-GB" dirty="0">
+                <a:ea typeface="Palatino" pitchFamily="2" charset="77"/>
+              </a:rPr>
+              <a:t>”</a:t>
+            </a:r>
+            <a:r>
+              <a:rPr lang="en-GB" dirty="0" err="1">
+                <a:ea typeface="Palatino" pitchFamily="2" charset="77"/>
+              </a:rPr>
+              <a:t>cmd</a:t>
+            </a:r>
+            <a:r>
+              <a:rPr lang="en-GB" dirty="0">
+                <a:ea typeface="Palatino" pitchFamily="2" charset="77"/>
+              </a:rPr>
+              <a:t>” in Windows</a:t>
             </a:r>
           </a:p>
           <a:p>
             <a:pPr lvl="1"/>
-            <a:endParaRPr lang="en-IT" dirty="0">
-              <a:latin typeface="Courier" pitchFamily="2" charset="0"/>
+            <a:r>
+              <a:rPr lang="en-GB" dirty="0">
+                <a:ea typeface="Palatino" pitchFamily="2" charset="77"/>
+              </a:rPr>
+              <a:t>“Terminal” in UNIX systems (Mac and Linux)</a:t>
+            </a:r>
+          </a:p>
+          <a:p>
+            <a:endParaRPr lang="en-GB" dirty="0">
+              <a:ea typeface="Palatino" pitchFamily="2" charset="77"/>
             </a:endParaRPr>
           </a:p>
           <a:p>
-            <a:pPr lvl="1"/>
-            <a:endParaRPr lang="en-IT" dirty="0">
-              <a:latin typeface="Courier" pitchFamily="2" charset="0"/>
+            <a:r>
+              <a:rPr lang="en-GB" dirty="0">
+                <a:ea typeface="Palatino" pitchFamily="2" charset="77"/>
+              </a:rPr>
+              <a:t>Some commands differs between </a:t>
+            </a:r>
+            <a:r>
+              <a:rPr lang="en-GB" dirty="0" err="1">
+                <a:ea typeface="Palatino" pitchFamily="2" charset="77"/>
+              </a:rPr>
+              <a:t>cmd</a:t>
+            </a:r>
+            <a:r>
+              <a:rPr lang="en-GB" dirty="0">
+                <a:ea typeface="Palatino" pitchFamily="2" charset="77"/>
+              </a:rPr>
+              <a:t> and Terminal. So to “unify” this set of commands, </a:t>
+            </a:r>
+            <a:r>
+              <a:rPr lang="en-GB" dirty="0">
+                <a:highlight>
+                  <a:srgbClr val="FFFF00"/>
+                </a:highlight>
+                <a:ea typeface="Palatino" pitchFamily="2" charset="77"/>
+              </a:rPr>
+              <a:t>Windows users should install and use </a:t>
+            </a:r>
+            <a:r>
+              <a:rPr lang="en-GB" b="1" dirty="0">
+                <a:highlight>
+                  <a:srgbClr val="FFFF00"/>
+                </a:highlight>
+                <a:ea typeface="Palatino" pitchFamily="2" charset="77"/>
+              </a:rPr>
+              <a:t>git-bash</a:t>
+            </a:r>
+            <a:r>
+              <a:rPr lang="en-GB" dirty="0">
+                <a:highlight>
+                  <a:srgbClr val="FFFF00"/>
+                </a:highlight>
+                <a:ea typeface="Palatino" pitchFamily="2" charset="77"/>
+              </a:rPr>
+              <a:t> instead of cmd</a:t>
+            </a:r>
+            <a:r>
+              <a:rPr lang="en-GB" dirty="0">
+                <a:ea typeface="Palatino" pitchFamily="2" charset="77"/>
+              </a:rPr>
+              <a:t>. </a:t>
+            </a:r>
+          </a:p>
+          <a:p>
+            <a:endParaRPr lang="en-GB" dirty="0">
+              <a:ea typeface="Palatino" pitchFamily="2" charset="77"/>
             </a:endParaRPr>
           </a:p>
           <a:p>
-            <a:pPr lvl="1"/>
-            <a:endParaRPr lang="en-IT" dirty="0">
-              <a:latin typeface="Courier" pitchFamily="2" charset="0"/>
+            <a:r>
+              <a:rPr lang="en-GB" dirty="0">
+                <a:ea typeface="Palatino" pitchFamily="2" charset="77"/>
+              </a:rPr>
+              <a:t>Using git-bash you will be able to use the same commands of Terminal. </a:t>
+            </a:r>
+          </a:p>
+          <a:p>
+            <a:pPr marL="0" indent="0">
+              <a:buNone/>
+            </a:pPr>
+            <a:endParaRPr lang="en-GB" dirty="0">
+              <a:ea typeface="Palatino" pitchFamily="2" charset="77"/>
             </a:endParaRPr>
           </a:p>
-          <a:p>
-            <a:pPr lvl="1"/>
-            <a:endParaRPr lang="en-IT" dirty="0">
-              <a:latin typeface="Courier" pitchFamily="2" charset="0"/>
-            </a:endParaRPr>
-          </a:p>
-          <a:p>
-            <a:pPr lvl="1"/>
-            <a:endParaRPr lang="en-IT" dirty="0">
-              <a:latin typeface="Courier" pitchFamily="2" charset="0"/>
-            </a:endParaRPr>
-          </a:p>
-          <a:p>
-            <a:pPr lvl="1"/>
-            <a:endParaRPr lang="en-IT" dirty="0">
-              <a:latin typeface="Courier" pitchFamily="2" charset="0"/>
-            </a:endParaRPr>
-          </a:p>
-          <a:p>
-            <a:r>
-              <a:rPr lang="en-IT" dirty="0">
-                <a:ea typeface="Palatino" pitchFamily="2" charset="77"/>
-              </a:rPr>
-              <a:t>If an error appears you will need to install it (step 4 of slide 11). Otherwise, if you see the git version printed out, you can skip step 4 of slide 11.</a:t>
-            </a:r>
+        </p:txBody>
+      </p:sp>
+      <p:sp>
+        <p:nvSpPr>
+          <p:cNvPr id="4" name="Slide Number Placeholder 3">
+            <a:extLst>
+              <a:ext uri="{FF2B5EF4-FFF2-40B4-BE49-F238E27FC236}">
+                <a16:creationId xmlns:a16="http://schemas.microsoft.com/office/drawing/2014/main" id="{01545332-2D31-9D4F-B4BB-B8BF57928CC2}"/>
+              </a:ext>
+            </a:extLst>
+          </p:cNvPr>
+          <p:cNvSpPr>
+            <a:spLocks noGrp="1"/>
+          </p:cNvSpPr>
+          <p:nvPr>
+            <p:ph type="sldNum" sz="quarter" idx="12"/>
+          </p:nvPr>
+        </p:nvSpPr>
+        <p:spPr/>
+        <p:txBody>
+          <a:bodyPr/>
+          <a:lstStyle/>
+          <a:p>
+            <a:fld id="{31DE2C5B-556E-47B8-A792-024C2FCA4ACC}" type="slidenum">
+              <a:rPr lang="en-GB" smtClean="0"/>
+              <a:t>9</a:t>
+            </a:fld>
+            <a:endParaRPr lang="en-GB"/>
           </a:p>
         </p:txBody>
       </p:sp>
       <p:pic>
         <p:nvPicPr>
-          <p:cNvPr id="5" name="Picture 4" descr="Graphical user interface, text&#10;&#10;Description automatically generated">
+          <p:cNvPr id="5" name="Picture 4">
             <a:extLst>
               <a:ext uri="{FF2B5EF4-FFF2-40B4-BE49-F238E27FC236}">
-                <a16:creationId xmlns:a16="http://schemas.microsoft.com/office/drawing/2014/main" id="{F57812B3-D3B9-7242-8271-8BD9E96C72A7}"/>
+                <a16:creationId xmlns:a16="http://schemas.microsoft.com/office/drawing/2014/main" id="{09B9EEF9-42D0-C546-A26E-EA554195EEA7}"/>
               </a:ext>
             </a:extLst>
           </p:cNvPr>
@@ -6622,60 +7067,25 @@
           <p:nvPr/>
         </p:nvPicPr>
         <p:blipFill>
-          <a:blip r:embed="rId3">
-            <a:extLst>
-              <a:ext uri="{28A0092B-C50C-407E-A947-70E740481C1C}">
-                <a14:useLocalDpi xmlns:a14="http://schemas.microsoft.com/office/drawing/2010/main" val="0"/>
-              </a:ext>
-            </a:extLst>
-          </a:blip>
+          <a:blip r:embed="rId3"/>
           <a:stretch>
             <a:fillRect/>
           </a:stretch>
         </p:blipFill>
         <p:spPr>
           <a:xfrm>
-            <a:off x="1914705" y="2175513"/>
-            <a:ext cx="7387625" cy="1551178"/>
+            <a:off x="8610600" y="1877421"/>
+            <a:ext cx="2857500" cy="2857500"/>
           </a:xfrm>
           <a:prstGeom prst="rect">
             <a:avLst/>
           </a:prstGeom>
         </p:spPr>
       </p:pic>
-      <p:sp>
-        <p:nvSpPr>
-          <p:cNvPr id="4" name="Slide Number Placeholder 3">
-            <a:extLst>
-              <a:ext uri="{FF2B5EF4-FFF2-40B4-BE49-F238E27FC236}">
-                <a16:creationId xmlns:a16="http://schemas.microsoft.com/office/drawing/2014/main" id="{FE01D888-710A-A44E-9C8F-17860AB7053F}"/>
-              </a:ext>
-            </a:extLst>
-          </p:cNvPr>
-          <p:cNvSpPr>
-            <a:spLocks noGrp="1"/>
-          </p:cNvSpPr>
-          <p:nvPr>
-            <p:ph type="sldNum" sz="quarter" idx="12"/>
-          </p:nvPr>
-        </p:nvSpPr>
-        <p:spPr/>
-        <p:txBody>
-          <a:bodyPr/>
-          <a:lstStyle/>
-          <a:p>
-            <a:fld id="{31DE2C5B-556E-47B8-A792-024C2FCA4ACC}" type="slidenum">
-              <a:rPr lang="en-GB" smtClean="0"/>
-              <a:t>9</a:t>
-            </a:fld>
-            <a:endParaRPr lang="en-GB" dirty="0"/>
-          </a:p>
-        </p:txBody>
-      </p:sp>
     </p:spTree>
     <p:extLst>
       <p:ext uri="{BB962C8B-B14F-4D97-AF65-F5344CB8AC3E}">
-        <p14:creationId xmlns:p14="http://schemas.microsoft.com/office/powerpoint/2010/main" val="2480795809"/>
+        <p14:creationId xmlns:p14="http://schemas.microsoft.com/office/powerpoint/2010/main" val="3940510233"/>
       </p:ext>
     </p:extLst>
   </p:cSld>

</xml_diff>